<commit_message>
Fix email address in title slide
</commit_message>
<xml_diff>
--- a/lectures/01-Intro.pptx
+++ b/lectures/01-Intro.pptx
@@ -143,7 +143,7 @@
     <p1510:client id="{67DEF145-38C9-4FCC-B336-31A29C54DC1D}" v="73" dt="2022-08-22T13:41:06.961"/>
     <p1510:client id="{8644706C-15E5-4AE9-BF86-0589D34712D6}" v="179" dt="2022-08-11T19:06:18.745"/>
     <p1510:client id="{98970ECB-6E1A-4511-AC1B-A61F29E989CF}" v="3412" dt="2022-06-29T04:56:45.671"/>
-    <p1510:client id="{9DBD1AC1-3CA2-4FE5-B43F-A653B7D89662}" v="17" dt="2022-08-22T21:55:29.888"/>
+    <p1510:client id="{9DBD1AC1-3CA2-4FE5-B43F-A653B7D89662}" v="23" dt="2022-08-24T00:58:55.012"/>
     <p1510:client id="{C64F8429-443E-4BC5-A3F1-5AC8E5BB145F}" v="11" dt="2022-06-29T05:02:26.005"/>
     <p1510:client id="{E1FFCA9D-0ABE-4E01-99CE-A99218C512E8}" v="96" dt="2022-08-19T00:43:04.050"/>
     <p1510:client id="{E3117403-4333-40F8-ADB5-ABEB50A9F87E}" v="43" dt="2022-06-30T18:41:44.117"/>
@@ -282,7 +282,7 @@
           <a:p>
             <a:fld id="{846CE7D5-CF57-46EF-B807-FDD0502418D4}" type="datetimeFigureOut">
               <a:rPr lang="en-US" smtClean="0"/>
-              <a:t>8/22/2022</a:t>
+              <a:t>8/23/2022</a:t>
             </a:fld>
             <a:endParaRPr lang="en-US"/>
           </a:p>
@@ -452,7 +452,7 @@
           <a:p>
             <a:fld id="{846CE7D5-CF57-46EF-B807-FDD0502418D4}" type="datetimeFigureOut">
               <a:rPr lang="en-US" smtClean="0"/>
-              <a:t>8/22/2022</a:t>
+              <a:t>8/23/2022</a:t>
             </a:fld>
             <a:endParaRPr lang="en-US"/>
           </a:p>
@@ -632,7 +632,7 @@
           <a:p>
             <a:fld id="{846CE7D5-CF57-46EF-B807-FDD0502418D4}" type="datetimeFigureOut">
               <a:rPr lang="en-US" smtClean="0"/>
-              <a:t>8/22/2022</a:t>
+              <a:t>8/23/2022</a:t>
             </a:fld>
             <a:endParaRPr lang="en-US"/>
           </a:p>
@@ -802,7 +802,7 @@
           <a:p>
             <a:fld id="{846CE7D5-CF57-46EF-B807-FDD0502418D4}" type="datetimeFigureOut">
               <a:rPr lang="en-US" smtClean="0"/>
-              <a:t>8/22/2022</a:t>
+              <a:t>8/23/2022</a:t>
             </a:fld>
             <a:endParaRPr lang="en-US"/>
           </a:p>
@@ -1048,7 +1048,7 @@
           <a:p>
             <a:fld id="{846CE7D5-CF57-46EF-B807-FDD0502418D4}" type="datetimeFigureOut">
               <a:rPr lang="en-US" smtClean="0"/>
-              <a:t>8/22/2022</a:t>
+              <a:t>8/23/2022</a:t>
             </a:fld>
             <a:endParaRPr lang="en-US"/>
           </a:p>
@@ -1280,7 +1280,7 @@
           <a:p>
             <a:fld id="{846CE7D5-CF57-46EF-B807-FDD0502418D4}" type="datetimeFigureOut">
               <a:rPr lang="en-US" smtClean="0"/>
-              <a:t>8/22/2022</a:t>
+              <a:t>8/23/2022</a:t>
             </a:fld>
             <a:endParaRPr lang="en-US"/>
           </a:p>
@@ -1647,7 +1647,7 @@
           <a:p>
             <a:fld id="{846CE7D5-CF57-46EF-B807-FDD0502418D4}" type="datetimeFigureOut">
               <a:rPr lang="en-US" smtClean="0"/>
-              <a:t>8/22/2022</a:t>
+              <a:t>8/23/2022</a:t>
             </a:fld>
             <a:endParaRPr lang="en-US"/>
           </a:p>
@@ -1765,7 +1765,7 @@
           <a:p>
             <a:fld id="{846CE7D5-CF57-46EF-B807-FDD0502418D4}" type="datetimeFigureOut">
               <a:rPr lang="en-US" smtClean="0"/>
-              <a:t>8/22/2022</a:t>
+              <a:t>8/23/2022</a:t>
             </a:fld>
             <a:endParaRPr lang="en-US"/>
           </a:p>
@@ -1860,7 +1860,7 @@
           <a:p>
             <a:fld id="{846CE7D5-CF57-46EF-B807-FDD0502418D4}" type="datetimeFigureOut">
               <a:rPr lang="en-US" smtClean="0"/>
-              <a:t>8/22/2022</a:t>
+              <a:t>8/23/2022</a:t>
             </a:fld>
             <a:endParaRPr lang="en-US"/>
           </a:p>
@@ -2137,7 +2137,7 @@
           <a:p>
             <a:fld id="{846CE7D5-CF57-46EF-B807-FDD0502418D4}" type="datetimeFigureOut">
               <a:rPr lang="en-US" smtClean="0"/>
-              <a:t>8/22/2022</a:t>
+              <a:t>8/23/2022</a:t>
             </a:fld>
             <a:endParaRPr lang="en-US"/>
           </a:p>
@@ -2394,7 +2394,7 @@
           <a:p>
             <a:fld id="{846CE7D5-CF57-46EF-B807-FDD0502418D4}" type="datetimeFigureOut">
               <a:rPr lang="en-US" smtClean="0"/>
-              <a:t>8/22/2022</a:t>
+              <a:t>8/23/2022</a:t>
             </a:fld>
             <a:endParaRPr lang="en-US"/>
           </a:p>
@@ -2607,7 +2607,7 @@
           <a:p>
             <a:fld id="{846CE7D5-CF57-46EF-B807-FDD0502418D4}" type="datetimeFigureOut">
               <a:rPr lang="en-US" smtClean="0"/>
-              <a:t>8/22/2022</a:t>
+              <a:t>8/23/2022</a:t>
             </a:fld>
             <a:endParaRPr lang="en-US"/>
           </a:p>
@@ -3096,7 +3096,7 @@
                 <a:ea typeface="Tahoma"/>
                 <a:cs typeface="Tahoma"/>
               </a:rPr>
-              <a:t>jdk72@zips.uakron.edu</a:t>
+              <a:t>jdk72@uakron.edu</a:t>
             </a:r>
             <a:endParaRPr lang="en-US" dirty="0">
               <a:ea typeface="+mn-lt"/>

</xml_diff>